<commit_message>
correções em algumas palavras
</commit_message>
<xml_diff>
--- a/Documentação/PPT grupo 10.pptx
+++ b/Documentação/PPT grupo 10.pptx
@@ -10831,7 +10831,7 @@
             </a:pPr>
             <a:fld id="{00000000-1234-1234-1234-123412341234}" type="slidenum">
               <a:rPr lang="en"/>
-              <a:t>‹#›</a:t>
+              <a:t>‹nº›</a:t>
             </a:fld>
             <a:endParaRPr/>
           </a:p>
@@ -11676,7 +11676,7 @@
             </a:pPr>
             <a:fld id="{00000000-1234-1234-1234-123412341234}" type="slidenum">
               <a:rPr lang="en"/>
-              <a:t>‹#›</a:t>
+              <a:t>‹nº›</a:t>
             </a:fld>
             <a:endParaRPr/>
           </a:p>
@@ -12557,7 +12557,7 @@
             </a:pPr>
             <a:fld id="{00000000-1234-1234-1234-123412341234}" type="slidenum">
               <a:rPr lang="en"/>
-              <a:t>‹#›</a:t>
+              <a:t>‹nº›</a:t>
             </a:fld>
             <a:endParaRPr/>
           </a:p>
@@ -13567,7 +13567,7 @@
             </a:pPr>
             <a:fld id="{00000000-1234-1234-1234-123412341234}" type="slidenum">
               <a:rPr lang="en"/>
-              <a:t>‹#›</a:t>
+              <a:t>‹nº›</a:t>
             </a:fld>
             <a:endParaRPr/>
           </a:p>
@@ -14706,7 +14706,7 @@
             </a:pPr>
             <a:fld id="{00000000-1234-1234-1234-123412341234}" type="slidenum">
               <a:rPr lang="en"/>
-              <a:t>‹#›</a:t>
+              <a:t>‹nº›</a:t>
             </a:fld>
             <a:endParaRPr/>
           </a:p>
@@ -15458,7 +15458,7 @@
             </a:pPr>
             <a:fld id="{00000000-1234-1234-1234-123412341234}" type="slidenum">
               <a:rPr lang="en"/>
-              <a:t>‹#›</a:t>
+              <a:t>‹nº›</a:t>
             </a:fld>
             <a:endParaRPr/>
           </a:p>
@@ -15850,7 +15850,7 @@
             </a:pPr>
             <a:fld id="{00000000-1234-1234-1234-123412341234}" type="slidenum">
               <a:rPr lang="en"/>
-              <a:t>‹#›</a:t>
+              <a:t>‹nº›</a:t>
             </a:fld>
             <a:endParaRPr/>
           </a:p>
@@ -16695,7 +16695,7 @@
             </a:pPr>
             <a:fld id="{00000000-1234-1234-1234-123412341234}" type="slidenum">
               <a:rPr lang="en"/>
-              <a:t>‹#›</a:t>
+              <a:t>‹nº›</a:t>
             </a:fld>
             <a:endParaRPr/>
           </a:p>
@@ -17365,7 +17365,7 @@
             </a:pPr>
             <a:fld id="{00000000-1234-1234-1234-123412341234}" type="slidenum">
               <a:rPr lang="en"/>
-              <a:t>‹#›</a:t>
+              <a:t>‹nº›</a:t>
             </a:fld>
             <a:endParaRPr/>
           </a:p>
@@ -24696,10 +24696,10 @@
               <a:buNone/>
             </a:pPr>
             <a:r>
-              <a:rPr lang="en"/>
-              <a:t>INTREGAVEIS</a:t>
+              <a:rPr lang="en" dirty="0"/>
+              <a:t>ENTREGAVEIS</a:t>
             </a:r>
-            <a:endParaRPr lang="en-US"/>
+            <a:endParaRPr lang="en-US" dirty="0"/>
           </a:p>
         </p:txBody>
       </p:sp>

</xml_diff>

<commit_message>
Alterei algumas coisas no site
adcionei uma nova imagem de fundo no sobre e mudei algumas coisas

importante: vamos nos atentar em organizar o codigo dentro de suas respectivas pastas e não desorganizar o código!!!!
</commit_message>
<xml_diff>
--- a/Documentação/PPT grupo 10.pptx
+++ b/Documentação/PPT grupo 10.pptx
@@ -281,6 +281,11 @@
       </a:defRPr>
     </a:lvl9pPr>
   </p:defaultTextStyle>
+  <p:extLst>
+    <p:ext uri="{EFAFB233-063F-42B5-8137-9DF3F51BA10A}">
+      <p15:sldGuideLst xmlns:p15="http://schemas.microsoft.com/office/powerpoint/2012/main"/>
+    </p:ext>
+  </p:extLst>
 </p:presentation>
 </file>
 
@@ -18124,37 +18129,17 @@
           <a:lstStyle/>
           <a:p>
             <a:br>
-              <a:rPr lang="en" sz="3200"/>
+              <a:rPr lang="en" sz="3200" dirty="0"/>
             </a:br>
             <a:r>
-              <a:rPr lang="en" sz="4400" err="1"/>
-              <a:t>Monitoramento</a:t>
-            </a:r>
-            <a:r>
-              <a:rPr lang="en" sz="4400"/>
-              <a:t> de </a:t>
-            </a:r>
-            <a:r>
-              <a:rPr lang="en" sz="4400" err="1"/>
-              <a:t>maquinas</a:t>
-            </a:r>
-            <a:r>
-              <a:rPr lang="en" sz="4400"/>
-              <a:t> </a:t>
-            </a:r>
-            <a:r>
-              <a:rPr lang="en" sz="4400" err="1"/>
-              <a:t>em</a:t>
-            </a:r>
-            <a:r>
-              <a:rPr lang="en" sz="4400"/>
-              <a:t> redes de </a:t>
+              <a:rPr lang="en" sz="4400" dirty="0"/>
+              <a:t>Monitoramento de maquinas em redes de </a:t>
             </a:r>
             <a:br>
-              <a:rPr lang="en" sz="4400"/>
+              <a:rPr lang="en" sz="4400" dirty="0"/>
             </a:br>
             <a:r>
-              <a:rPr lang="en" sz="4400"/>
+              <a:rPr lang="en" sz="4400" dirty="0"/>
               <a:t>Fast Food</a:t>
             </a:r>
           </a:p>
@@ -22661,7 +22646,7 @@
         </p:blipFill>
         <p:spPr>
           <a:xfrm>
-            <a:off x="0" y="2974"/>
+            <a:off x="7684" y="10658"/>
             <a:ext cx="9143999" cy="5179114"/>
           </a:xfrm>
           <a:prstGeom prst="rect">
@@ -22888,7 +22873,7 @@
               <a:buNone/>
             </a:pPr>
             <a:r>
-              <a:rPr lang="en" sz="6000">
+              <a:rPr lang="en" sz="6000" dirty="0">
                 <a:solidFill>
                   <a:schemeClr val="accent5"/>
                 </a:solidFill>

</xml_diff>